<commit_message>
Updated documentation. Simplified logging messages.
</commit_message>
<xml_diff>
--- a/Documentation/Documentation.pptx
+++ b/Documentation/Documentation.pptx
@@ -104,6 +104,11 @@
       </a:defRPr>
     </a:lvl9pPr>
   </p:defaultTextStyle>
+  <p:extLst>
+    <p:ext uri="{EFAFB233-063F-42B5-8137-9DF3F51BA10A}">
+      <p15:sldGuideLst xmlns:p15="http://schemas.microsoft.com/office/powerpoint/2012/main"/>
+    </p:ext>
+  </p:extLst>
 </p:presentation>
 </file>
 
@@ -3869,42 +3874,6 @@
       </p:sp>
       <p:cxnSp>
         <p:nvCxnSpPr>
-          <p:cNvPr id="16" name="Rak koppling 15">
-            <a:extLst>
-              <a:ext uri="{FF2B5EF4-FFF2-40B4-BE49-F238E27FC236}">
-                <a16:creationId xmlns:a16="http://schemas.microsoft.com/office/drawing/2014/main" id="{A69D299F-C798-7AC2-842C-CB420D63DDC7}"/>
-              </a:ext>
-            </a:extLst>
-          </p:cNvPr>
-          <p:cNvCxnSpPr/>
-          <p:nvPr/>
-        </p:nvCxnSpPr>
-        <p:spPr>
-          <a:xfrm>
-            <a:off x="2177935" y="4311535"/>
-            <a:ext cx="0" cy="0"/>
-          </a:xfrm>
-          <a:prstGeom prst="line">
-            <a:avLst/>
-          </a:prstGeom>
-        </p:spPr>
-        <p:style>
-          <a:lnRef idx="1">
-            <a:schemeClr val="accent1"/>
-          </a:lnRef>
-          <a:fillRef idx="0">
-            <a:schemeClr val="accent1"/>
-          </a:fillRef>
-          <a:effectRef idx="0">
-            <a:schemeClr val="accent1"/>
-          </a:effectRef>
-          <a:fontRef idx="minor">
-            <a:schemeClr val="tx1"/>
-          </a:fontRef>
-        </p:style>
-      </p:cxnSp>
-      <p:cxnSp>
-        <p:nvCxnSpPr>
           <p:cNvPr id="18" name="Rak koppling 17">
             <a:extLst>
               <a:ext uri="{FF2B5EF4-FFF2-40B4-BE49-F238E27FC236}">
@@ -3970,7 +3939,7 @@
           </a:xfrm>
           <a:prstGeom prst="bentConnector3">
             <a:avLst>
-              <a:gd name="adj1" fmla="val -4124865"/>
+              <a:gd name="adj1" fmla="val -8424720"/>
             </a:avLst>
           </a:prstGeom>
           <a:ln w="76200">
@@ -4017,7 +3986,7 @@
           </a:xfrm>
           <a:prstGeom prst="bentConnector3">
             <a:avLst>
-              <a:gd name="adj1" fmla="val 1800000"/>
+              <a:gd name="adj1" fmla="val 3720000"/>
             </a:avLst>
           </a:prstGeom>
           <a:ln w="76200">
@@ -4064,7 +4033,7 @@
           </a:xfrm>
           <a:prstGeom prst="bentConnector3">
             <a:avLst>
-              <a:gd name="adj1" fmla="val 1800000"/>
+              <a:gd name="adj1" fmla="val 5465457"/>
             </a:avLst>
           </a:prstGeom>
           <a:ln w="76200">

</xml_diff>

<commit_message>
Simplified configuration. Release 1.11.0.
</commit_message>
<xml_diff>
--- a/Documentation/Documentation.pptx
+++ b/Documentation/Documentation.pptx
@@ -259,7 +259,7 @@
           <a:p>
             <a:fld id="{168C626D-AA36-4798-9709-9BD35C8D3EBA}" type="datetimeFigureOut">
               <a:rPr lang="sv-SE" smtClean="0"/>
-              <a:t>2023-06-18</a:t>
+              <a:t>2024-03-25</a:t>
             </a:fld>
             <a:endParaRPr lang="sv-SE"/>
           </a:p>
@@ -457,7 +457,7 @@
           <a:p>
             <a:fld id="{168C626D-AA36-4798-9709-9BD35C8D3EBA}" type="datetimeFigureOut">
               <a:rPr lang="sv-SE" smtClean="0"/>
-              <a:t>2023-06-18</a:t>
+              <a:t>2024-03-25</a:t>
             </a:fld>
             <a:endParaRPr lang="sv-SE"/>
           </a:p>
@@ -665,7 +665,7 @@
           <a:p>
             <a:fld id="{168C626D-AA36-4798-9709-9BD35C8D3EBA}" type="datetimeFigureOut">
               <a:rPr lang="sv-SE" smtClean="0"/>
-              <a:t>2023-06-18</a:t>
+              <a:t>2024-03-25</a:t>
             </a:fld>
             <a:endParaRPr lang="sv-SE"/>
           </a:p>
@@ -863,7 +863,7 @@
           <a:p>
             <a:fld id="{168C626D-AA36-4798-9709-9BD35C8D3EBA}" type="datetimeFigureOut">
               <a:rPr lang="sv-SE" smtClean="0"/>
-              <a:t>2023-06-18</a:t>
+              <a:t>2024-03-25</a:t>
             </a:fld>
             <a:endParaRPr lang="sv-SE"/>
           </a:p>
@@ -1138,7 +1138,7 @@
           <a:p>
             <a:fld id="{168C626D-AA36-4798-9709-9BD35C8D3EBA}" type="datetimeFigureOut">
               <a:rPr lang="sv-SE" smtClean="0"/>
-              <a:t>2023-06-18</a:t>
+              <a:t>2024-03-25</a:t>
             </a:fld>
             <a:endParaRPr lang="sv-SE"/>
           </a:p>
@@ -1403,7 +1403,7 @@
           <a:p>
             <a:fld id="{168C626D-AA36-4798-9709-9BD35C8D3EBA}" type="datetimeFigureOut">
               <a:rPr lang="sv-SE" smtClean="0"/>
-              <a:t>2023-06-18</a:t>
+              <a:t>2024-03-25</a:t>
             </a:fld>
             <a:endParaRPr lang="sv-SE"/>
           </a:p>
@@ -1815,7 +1815,7 @@
           <a:p>
             <a:fld id="{168C626D-AA36-4798-9709-9BD35C8D3EBA}" type="datetimeFigureOut">
               <a:rPr lang="sv-SE" smtClean="0"/>
-              <a:t>2023-06-18</a:t>
+              <a:t>2024-03-25</a:t>
             </a:fld>
             <a:endParaRPr lang="sv-SE"/>
           </a:p>
@@ -1956,7 +1956,7 @@
           <a:p>
             <a:fld id="{168C626D-AA36-4798-9709-9BD35C8D3EBA}" type="datetimeFigureOut">
               <a:rPr lang="sv-SE" smtClean="0"/>
-              <a:t>2023-06-18</a:t>
+              <a:t>2024-03-25</a:t>
             </a:fld>
             <a:endParaRPr lang="sv-SE"/>
           </a:p>
@@ -2069,7 +2069,7 @@
           <a:p>
             <a:fld id="{168C626D-AA36-4798-9709-9BD35C8D3EBA}" type="datetimeFigureOut">
               <a:rPr lang="sv-SE" smtClean="0"/>
-              <a:t>2023-06-18</a:t>
+              <a:t>2024-03-25</a:t>
             </a:fld>
             <a:endParaRPr lang="sv-SE"/>
           </a:p>
@@ -2380,7 +2380,7 @@
           <a:p>
             <a:fld id="{168C626D-AA36-4798-9709-9BD35C8D3EBA}" type="datetimeFigureOut">
               <a:rPr lang="sv-SE" smtClean="0"/>
-              <a:t>2023-06-18</a:t>
+              <a:t>2024-03-25</a:t>
             </a:fld>
             <a:endParaRPr lang="sv-SE"/>
           </a:p>
@@ -2668,7 +2668,7 @@
           <a:p>
             <a:fld id="{168C626D-AA36-4798-9709-9BD35C8D3EBA}" type="datetimeFigureOut">
               <a:rPr lang="sv-SE" smtClean="0"/>
-              <a:t>2023-06-18</a:t>
+              <a:t>2024-03-25</a:t>
             </a:fld>
             <a:endParaRPr lang="sv-SE"/>
           </a:p>
@@ -2909,7 +2909,7 @@
           <a:p>
             <a:fld id="{168C626D-AA36-4798-9709-9BD35C8D3EBA}" type="datetimeFigureOut">
               <a:rPr lang="sv-SE" smtClean="0"/>
-              <a:t>2023-06-18</a:t>
+              <a:t>2024-03-25</a:t>
             </a:fld>
             <a:endParaRPr lang="sv-SE"/>
           </a:p>
@@ -3340,7 +3340,7 @@
         </p:nvSpPr>
         <p:spPr>
           <a:xfrm>
-            <a:off x="478632" y="5167314"/>
+            <a:off x="478631" y="5115385"/>
             <a:ext cx="5922856" cy="4267200"/>
           </a:xfrm>
           <a:prstGeom prst="rect">
@@ -4038,6 +4038,7 @@
           </a:bodyPr>
           <a:lstStyle/>
           <a:p>
+            <a:pPr algn="r"/>
             <a:r>
               <a:rPr lang="en-GB" dirty="0"/>
               <a:t>24 V</a:t>
@@ -4419,9 +4420,95 @@
           <p:nvPr/>
         </p:nvSpPr>
         <p:spPr>
-          <a:xfrm rot="16200000">
-            <a:off x="594398" y="5895987"/>
+          <a:xfrm>
+            <a:off x="1159813" y="6505717"/>
             <a:ext cx="534667" cy="276999"/>
+          </a:xfrm>
+          <a:prstGeom prst="rect">
+            <a:avLst/>
+          </a:prstGeom>
+          <a:solidFill>
+            <a:schemeClr val="accent2"/>
+          </a:solidFill>
+        </p:spPr>
+        <p:txBody>
+          <a:bodyPr wrap="square" lIns="36000" tIns="0" rIns="36000" bIns="0" rtlCol="0">
+            <a:spAutoFit/>
+          </a:bodyPr>
+          <a:lstStyle/>
+          <a:p>
+            <a:pPr algn="ctr"/>
+            <a:r>
+              <a:rPr lang="en-GB" sz="900" b="1" dirty="0"/>
+              <a:t>Stop indicator</a:t>
+            </a:r>
+          </a:p>
+        </p:txBody>
+      </p:sp>
+      <p:cxnSp>
+        <p:nvCxnSpPr>
+          <p:cNvPr id="41" name="Rak koppling 17">
+            <a:extLst>
+              <a:ext uri="{FF2B5EF4-FFF2-40B4-BE49-F238E27FC236}">
+                <a16:creationId xmlns:a16="http://schemas.microsoft.com/office/drawing/2014/main" id="{175D17AE-654D-8C74-8C2E-AC2F6CFCC3EC}"/>
+              </a:ext>
+            </a:extLst>
+          </p:cNvPr>
+          <p:cNvCxnSpPr>
+            <a:cxnSpLocks/>
+            <a:stCxn id="40" idx="3"/>
+            <a:endCxn id="7" idx="0"/>
+          </p:cNvCxnSpPr>
+          <p:nvPr/>
+        </p:nvCxnSpPr>
+        <p:spPr>
+          <a:xfrm flipV="1">
+            <a:off x="1694480" y="6553199"/>
+            <a:ext cx="918451" cy="91018"/>
+          </a:xfrm>
+          <a:prstGeom prst="bentConnector4">
+            <a:avLst>
+              <a:gd name="adj1" fmla="val 22561"/>
+              <a:gd name="adj2" fmla="val 563575"/>
+            </a:avLst>
+          </a:prstGeom>
+          <a:ln w="76200">
+            <a:solidFill>
+              <a:srgbClr val="7030A0"/>
+            </a:solidFill>
+          </a:ln>
+        </p:spPr>
+        <p:style>
+          <a:lnRef idx="1">
+            <a:schemeClr val="accent1"/>
+          </a:lnRef>
+          <a:fillRef idx="0">
+            <a:schemeClr val="accent1"/>
+          </a:fillRef>
+          <a:effectRef idx="0">
+            <a:schemeClr val="accent1"/>
+          </a:effectRef>
+          <a:fontRef idx="minor">
+            <a:schemeClr val="tx1"/>
+          </a:fontRef>
+        </p:style>
+      </p:cxnSp>
+      <p:sp>
+        <p:nvSpPr>
+          <p:cNvPr id="15" name="textruta 14">
+            <a:extLst>
+              <a:ext uri="{FF2B5EF4-FFF2-40B4-BE49-F238E27FC236}">
+                <a16:creationId xmlns:a16="http://schemas.microsoft.com/office/drawing/2014/main" id="{72BA3A49-C810-4EA4-CAAD-27BBA4F71AC4}"/>
+              </a:ext>
+            </a:extLst>
+          </p:cNvPr>
+          <p:cNvSpPr txBox="1"/>
+          <p:nvPr/>
+        </p:nvSpPr>
+        <p:spPr>
+          <a:xfrm>
+            <a:off x="544152" y="5757861"/>
+            <a:ext cx="537194" cy="369099"/>
           </a:xfrm>
           <a:prstGeom prst="rect">
             <a:avLst/>
@@ -4429,38 +4516,38 @@
           <a:noFill/>
         </p:spPr>
         <p:txBody>
-          <a:bodyPr wrap="square" lIns="36000" tIns="0" rIns="36000" bIns="0" rtlCol="0">
+          <a:bodyPr wrap="square" rtlCol="0">
             <a:spAutoFit/>
           </a:bodyPr>
           <a:lstStyle/>
           <a:p>
-            <a:pPr algn="ctr"/>
-            <a:r>
-              <a:rPr lang="en-GB" sz="900" b="1" dirty="0"/>
-              <a:t>Stop indicator</a:t>
+            <a:pPr algn="r"/>
+            <a:r>
+              <a:rPr lang="en-GB" dirty="0"/>
+              <a:t>V</a:t>
             </a:r>
           </a:p>
         </p:txBody>
       </p:sp>
       <p:cxnSp>
         <p:nvCxnSpPr>
-          <p:cNvPr id="41" name="Rak koppling 17">
-            <a:extLst>
-              <a:ext uri="{FF2B5EF4-FFF2-40B4-BE49-F238E27FC236}">
-                <a16:creationId xmlns:a16="http://schemas.microsoft.com/office/drawing/2014/main" id="{175D17AE-654D-8C74-8C2E-AC2F6CFCC3EC}"/>
+          <p:cNvPr id="16" name="Rak koppling 17">
+            <a:extLst>
+              <a:ext uri="{FF2B5EF4-FFF2-40B4-BE49-F238E27FC236}">
+                <a16:creationId xmlns:a16="http://schemas.microsoft.com/office/drawing/2014/main" id="{1BDBAB06-C89F-3CFC-B658-AB0E19577959}"/>
               </a:ext>
             </a:extLst>
           </p:cNvPr>
           <p:cNvCxnSpPr>
             <a:cxnSpLocks/>
-            <a:endCxn id="7" idx="0"/>
+            <a:stCxn id="40" idx="1"/>
           </p:cNvCxnSpPr>
           <p:nvPr/>
         </p:nvCxnSpPr>
         <p:spPr>
-          <a:xfrm>
-            <a:off x="1027113" y="6136091"/>
-            <a:ext cx="1585818" cy="417108"/>
+          <a:xfrm rot="10800000">
+            <a:off x="1081347" y="6069807"/>
+            <a:ext cx="78467" cy="574411"/>
           </a:xfrm>
           <a:prstGeom prst="bentConnector2">
             <a:avLst/>

</xml_diff>